<commit_message>
Finished for assign Email finished Reset password finished Verify account finished
</commit_message>
<xml_diff>
--- a/Jay/wwwroot/media/app/logo.pptx
+++ b/Jay/wwwroot/media/app/logo.pptx
@@ -265,7 +265,7 @@
           <a:p>
             <a:fld id="{DAB11561-6121-4EE4-A59B-51ED449629A0}" type="datetimeFigureOut">
               <a:rPr lang="en-US" smtClean="0"/>
-              <a:t>7/7/2022</a:t>
+              <a:t>7/9/2022</a:t>
             </a:fld>
             <a:endParaRPr lang="en-US"/>
           </a:p>
@@ -465,7 +465,7 @@
           <a:p>
             <a:fld id="{DAB11561-6121-4EE4-A59B-51ED449629A0}" type="datetimeFigureOut">
               <a:rPr lang="en-US" smtClean="0"/>
-              <a:t>7/7/2022</a:t>
+              <a:t>7/9/2022</a:t>
             </a:fld>
             <a:endParaRPr lang="en-US"/>
           </a:p>
@@ -675,7 +675,7 @@
           <a:p>
             <a:fld id="{DAB11561-6121-4EE4-A59B-51ED449629A0}" type="datetimeFigureOut">
               <a:rPr lang="en-US" smtClean="0"/>
-              <a:t>7/7/2022</a:t>
+              <a:t>7/9/2022</a:t>
             </a:fld>
             <a:endParaRPr lang="en-US"/>
           </a:p>
@@ -875,7 +875,7 @@
           <a:p>
             <a:fld id="{DAB11561-6121-4EE4-A59B-51ED449629A0}" type="datetimeFigureOut">
               <a:rPr lang="en-US" smtClean="0"/>
-              <a:t>7/7/2022</a:t>
+              <a:t>7/9/2022</a:t>
             </a:fld>
             <a:endParaRPr lang="en-US"/>
           </a:p>
@@ -1151,7 +1151,7 @@
           <a:p>
             <a:fld id="{DAB11561-6121-4EE4-A59B-51ED449629A0}" type="datetimeFigureOut">
               <a:rPr lang="en-US" smtClean="0"/>
-              <a:t>7/7/2022</a:t>
+              <a:t>7/9/2022</a:t>
             </a:fld>
             <a:endParaRPr lang="en-US"/>
           </a:p>
@@ -1419,7 +1419,7 @@
           <a:p>
             <a:fld id="{DAB11561-6121-4EE4-A59B-51ED449629A0}" type="datetimeFigureOut">
               <a:rPr lang="en-US" smtClean="0"/>
-              <a:t>7/7/2022</a:t>
+              <a:t>7/9/2022</a:t>
             </a:fld>
             <a:endParaRPr lang="en-US"/>
           </a:p>
@@ -1834,7 +1834,7 @@
           <a:p>
             <a:fld id="{DAB11561-6121-4EE4-A59B-51ED449629A0}" type="datetimeFigureOut">
               <a:rPr lang="en-US" smtClean="0"/>
-              <a:t>7/7/2022</a:t>
+              <a:t>7/9/2022</a:t>
             </a:fld>
             <a:endParaRPr lang="en-US"/>
           </a:p>
@@ -1976,7 +1976,7 @@
           <a:p>
             <a:fld id="{DAB11561-6121-4EE4-A59B-51ED449629A0}" type="datetimeFigureOut">
               <a:rPr lang="en-US" smtClean="0"/>
-              <a:t>7/7/2022</a:t>
+              <a:t>7/9/2022</a:t>
             </a:fld>
             <a:endParaRPr lang="en-US"/>
           </a:p>
@@ -2089,7 +2089,7 @@
           <a:p>
             <a:fld id="{DAB11561-6121-4EE4-A59B-51ED449629A0}" type="datetimeFigureOut">
               <a:rPr lang="en-US" smtClean="0"/>
-              <a:t>7/7/2022</a:t>
+              <a:t>7/9/2022</a:t>
             </a:fld>
             <a:endParaRPr lang="en-US"/>
           </a:p>
@@ -2402,7 +2402,7 @@
           <a:p>
             <a:fld id="{DAB11561-6121-4EE4-A59B-51ED449629A0}" type="datetimeFigureOut">
               <a:rPr lang="en-US" smtClean="0"/>
-              <a:t>7/7/2022</a:t>
+              <a:t>7/9/2022</a:t>
             </a:fld>
             <a:endParaRPr lang="en-US"/>
           </a:p>
@@ -2691,7 +2691,7 @@
           <a:p>
             <a:fld id="{DAB11561-6121-4EE4-A59B-51ED449629A0}" type="datetimeFigureOut">
               <a:rPr lang="en-US" smtClean="0"/>
-              <a:t>7/7/2022</a:t>
+              <a:t>7/9/2022</a:t>
             </a:fld>
             <a:endParaRPr lang="en-US"/>
           </a:p>
@@ -2934,7 +2934,7 @@
           <a:p>
             <a:fld id="{DAB11561-6121-4EE4-A59B-51ED449629A0}" type="datetimeFigureOut">
               <a:rPr lang="en-US" smtClean="0"/>
-              <a:t>7/7/2022</a:t>
+              <a:t>7/9/2022</a:t>
             </a:fld>
             <a:endParaRPr lang="en-US"/>
           </a:p>
@@ -3868,7 +3868,7 @@
         </p:blipFill>
         <p:spPr>
           <a:xfrm>
-            <a:off x="4585252" y="2189921"/>
+            <a:off x="4585252" y="2189920"/>
             <a:ext cx="3021496" cy="2478157"/>
           </a:xfrm>
           <a:prstGeom prst="rect">
@@ -3908,10 +3908,10 @@
       </p:grpSpPr>
       <p:pic>
         <p:nvPicPr>
-          <p:cNvPr id="5" name="Imagen 4">
-            <a:extLst>
-              <a:ext uri="{FF2B5EF4-FFF2-40B4-BE49-F238E27FC236}">
-                <a16:creationId xmlns:a16="http://schemas.microsoft.com/office/drawing/2014/main" id="{C8A23BAF-8739-F65B-64D5-D3EE11E6FB58}"/>
+          <p:cNvPr id="3" name="Imagen 2">
+            <a:extLst>
+              <a:ext uri="{FF2B5EF4-FFF2-40B4-BE49-F238E27FC236}">
+                <a16:creationId xmlns:a16="http://schemas.microsoft.com/office/drawing/2014/main" id="{E4D2D584-212F-8FEB-7892-20EA6D7078D1}"/>
               </a:ext>
             </a:extLst>
           </p:cNvPr>
@@ -3928,10 +3928,40 @@
         </p:blipFill>
         <p:spPr>
           <a:xfrm>
-            <a:off x="4248752" y="1584800"/>
+            <a:off x="6559885" y="973321"/>
+            <a:ext cx="3987130" cy="3981033"/>
+          </a:xfrm>
+          <a:prstGeom prst="ellipse">
+            <a:avLst/>
+          </a:prstGeom>
+        </p:spPr>
+      </p:pic>
+      <p:pic>
+        <p:nvPicPr>
+          <p:cNvPr id="2" name="Imagen 1">
+            <a:extLst>
+              <a:ext uri="{FF2B5EF4-FFF2-40B4-BE49-F238E27FC236}">
+                <a16:creationId xmlns:a16="http://schemas.microsoft.com/office/drawing/2014/main" id="{623F397F-F304-2A5C-5C2F-AD6EC28F214C}"/>
+              </a:ext>
+            </a:extLst>
+          </p:cNvPr>
+          <p:cNvPicPr>
+            <a:picLocks noChangeAspect="1"/>
+          </p:cNvPicPr>
+          <p:nvPr/>
+        </p:nvPicPr>
+        <p:blipFill>
+          <a:blip r:embed="rId3"/>
+          <a:stretch>
+            <a:fillRect/>
+          </a:stretch>
+        </p:blipFill>
+        <p:spPr>
+          <a:xfrm>
+            <a:off x="825835" y="1265954"/>
             <a:ext cx="3694496" cy="3688400"/>
           </a:xfrm>
-          <a:prstGeom prst="rect">
+          <a:prstGeom prst="ellipse">
             <a:avLst/>
           </a:prstGeom>
         </p:spPr>

</xml_diff>